<commit_message>
Python and math slides
</commit_message>
<xml_diff>
--- a/1. Intro To ML and Data Science/Overview.pptx
+++ b/1. Intro To ML and Data Science/Overview.pptx
@@ -1995,42 +1995,6 @@
         </a:p>
       </dgm:t>
     </dgm:pt>
-    <dgm:pt modelId="{52E09203-1DBD-4088-8B39-7EBDE8A229DB}">
-      <dgm:prSet/>
-      <dgm:spPr/>
-      <dgm:t>
-        <a:bodyPr/>
-        <a:lstStyle/>
-        <a:p>
-          <a:r>
-            <a:rPr lang="en-US" dirty="0"/>
-            <a:t>Deep Q Networks</a:t>
-          </a:r>
-        </a:p>
-      </dgm:t>
-    </dgm:pt>
-    <dgm:pt modelId="{C9845EFB-3AF7-4ADB-ACE6-76B3B4493422}" type="parTrans" cxnId="{D723CC6F-2B70-4C18-A45C-498B16FFA09A}">
-      <dgm:prSet/>
-      <dgm:spPr/>
-      <dgm:t>
-        <a:bodyPr/>
-        <a:lstStyle/>
-        <a:p>
-          <a:endParaRPr lang="en-US"/>
-        </a:p>
-      </dgm:t>
-    </dgm:pt>
-    <dgm:pt modelId="{54E1F52E-98C3-4BA6-8994-381CB972FA2D}" type="sibTrans" cxnId="{D723CC6F-2B70-4C18-A45C-498B16FFA09A}">
-      <dgm:prSet/>
-      <dgm:spPr/>
-      <dgm:t>
-        <a:bodyPr/>
-        <a:lstStyle/>
-        <a:p>
-          <a:endParaRPr lang="en-US"/>
-        </a:p>
-      </dgm:t>
-    </dgm:pt>
     <dgm:pt modelId="{A51B5636-9447-4FFA-ACA9-3ED6DD4FC9FA}" type="pres">
       <dgm:prSet presAssocID="{53FA7F5E-9B1A-4365-9EB8-0054070003BB}" presName="hierChild1" presStyleCnt="0">
         <dgm:presLayoutVars>
@@ -2096,7 +2060,7 @@
       <dgm:spPr/>
     </dgm:pt>
     <dgm:pt modelId="{3CF24D22-C763-4B0A-8619-B073B24FBCB3}" type="pres">
-      <dgm:prSet presAssocID="{6A6135B9-7FB0-4196-933D-BE93268A199F}" presName="Name17" presStyleLbl="parChTrans1D3" presStyleIdx="0" presStyleCnt="5"/>
+      <dgm:prSet presAssocID="{6A6135B9-7FB0-4196-933D-BE93268A199F}" presName="Name17" presStyleLbl="parChTrans1D3" presStyleIdx="0" presStyleCnt="4"/>
       <dgm:spPr/>
     </dgm:pt>
     <dgm:pt modelId="{5459B15B-443A-4500-9694-9CAFA012E602}" type="pres">
@@ -2108,11 +2072,11 @@
       <dgm:spPr/>
     </dgm:pt>
     <dgm:pt modelId="{940B7AEA-E53B-4C88-A840-459AEB6D54A6}" type="pres">
-      <dgm:prSet presAssocID="{A2CD083D-1C84-4478-9F3F-62AFB44894B1}" presName="background3" presStyleLbl="node3" presStyleIdx="0" presStyleCnt="5"/>
+      <dgm:prSet presAssocID="{A2CD083D-1C84-4478-9F3F-62AFB44894B1}" presName="background3" presStyleLbl="node3" presStyleIdx="0" presStyleCnt="4"/>
       <dgm:spPr/>
     </dgm:pt>
     <dgm:pt modelId="{C42104E1-F07F-498D-8C41-6D2B1DBB2EBA}" type="pres">
-      <dgm:prSet presAssocID="{A2CD083D-1C84-4478-9F3F-62AFB44894B1}" presName="text3" presStyleLbl="fgAcc3" presStyleIdx="0" presStyleCnt="5">
+      <dgm:prSet presAssocID="{A2CD083D-1C84-4478-9F3F-62AFB44894B1}" presName="text3" presStyleLbl="fgAcc3" presStyleIdx="0" presStyleCnt="4">
         <dgm:presLayoutVars>
           <dgm:chPref val="3"/>
         </dgm:presLayoutVars>
@@ -2124,7 +2088,7 @@
       <dgm:spPr/>
     </dgm:pt>
     <dgm:pt modelId="{5442838E-007B-4CD2-834A-670B44EB0B76}" type="pres">
-      <dgm:prSet presAssocID="{EB287531-8730-4B5D-9381-0AEA4C97CD15}" presName="Name17" presStyleLbl="parChTrans1D3" presStyleIdx="1" presStyleCnt="5"/>
+      <dgm:prSet presAssocID="{EB287531-8730-4B5D-9381-0AEA4C97CD15}" presName="Name17" presStyleLbl="parChTrans1D3" presStyleIdx="1" presStyleCnt="4"/>
       <dgm:spPr/>
     </dgm:pt>
     <dgm:pt modelId="{114F6ACD-3BF1-43CA-AE07-30AA95D16639}" type="pres">
@@ -2136,11 +2100,11 @@
       <dgm:spPr/>
     </dgm:pt>
     <dgm:pt modelId="{DAA0D212-4225-4579-AF2F-1ED1008247EA}" type="pres">
-      <dgm:prSet presAssocID="{EF45CBAD-5489-4A11-B7D5-1BF89C976CD6}" presName="background3" presStyleLbl="node3" presStyleIdx="1" presStyleCnt="5"/>
+      <dgm:prSet presAssocID="{EF45CBAD-5489-4A11-B7D5-1BF89C976CD6}" presName="background3" presStyleLbl="node3" presStyleIdx="1" presStyleCnt="4"/>
       <dgm:spPr/>
     </dgm:pt>
     <dgm:pt modelId="{501ECA39-7506-4EA3-98FA-BBA1AD178BBE}" type="pres">
-      <dgm:prSet presAssocID="{EF45CBAD-5489-4A11-B7D5-1BF89C976CD6}" presName="text3" presStyleLbl="fgAcc3" presStyleIdx="1" presStyleCnt="5">
+      <dgm:prSet presAssocID="{EF45CBAD-5489-4A11-B7D5-1BF89C976CD6}" presName="text3" presStyleLbl="fgAcc3" presStyleIdx="1" presStyleCnt="4">
         <dgm:presLayoutVars>
           <dgm:chPref val="3"/>
         </dgm:presLayoutVars>
@@ -2180,7 +2144,7 @@
       <dgm:spPr/>
     </dgm:pt>
     <dgm:pt modelId="{1F4C009B-DA2F-4EDD-9318-D0273BB07D3B}" type="pres">
-      <dgm:prSet presAssocID="{46AC8AD3-4C41-4AD2-BB1C-B39966A90453}" presName="Name17" presStyleLbl="parChTrans1D3" presStyleIdx="2" presStyleCnt="5"/>
+      <dgm:prSet presAssocID="{46AC8AD3-4C41-4AD2-BB1C-B39966A90453}" presName="Name17" presStyleLbl="parChTrans1D3" presStyleIdx="2" presStyleCnt="4"/>
       <dgm:spPr/>
     </dgm:pt>
     <dgm:pt modelId="{A5A46EE1-EA11-49D9-A5BB-59C6BB6C266B}" type="pres">
@@ -2192,11 +2156,11 @@
       <dgm:spPr/>
     </dgm:pt>
     <dgm:pt modelId="{DFD8C324-C6AC-45AC-82A5-0DCCBC87D263}" type="pres">
-      <dgm:prSet presAssocID="{1D47B408-2953-4891-AD88-1A326D85A6EE}" presName="background3" presStyleLbl="node3" presStyleIdx="2" presStyleCnt="5"/>
+      <dgm:prSet presAssocID="{1D47B408-2953-4891-AD88-1A326D85A6EE}" presName="background3" presStyleLbl="node3" presStyleIdx="2" presStyleCnt="4"/>
       <dgm:spPr/>
     </dgm:pt>
     <dgm:pt modelId="{40359719-29DB-4B64-B983-3671E1C251AC}" type="pres">
-      <dgm:prSet presAssocID="{1D47B408-2953-4891-AD88-1A326D85A6EE}" presName="text3" presStyleLbl="fgAcc3" presStyleIdx="2" presStyleCnt="5">
+      <dgm:prSet presAssocID="{1D47B408-2953-4891-AD88-1A326D85A6EE}" presName="text3" presStyleLbl="fgAcc3" presStyleIdx="2" presStyleCnt="4">
         <dgm:presLayoutVars>
           <dgm:chPref val="3"/>
         </dgm:presLayoutVars>
@@ -2208,7 +2172,7 @@
       <dgm:spPr/>
     </dgm:pt>
     <dgm:pt modelId="{F2DCA186-0CE9-4587-A2A7-5F67FE2A0344}" type="pres">
-      <dgm:prSet presAssocID="{8F716C72-7EA3-4032-AB4B-315D57747253}" presName="Name17" presStyleLbl="parChTrans1D3" presStyleIdx="3" presStyleCnt="5"/>
+      <dgm:prSet presAssocID="{8F716C72-7EA3-4032-AB4B-315D57747253}" presName="Name17" presStyleLbl="parChTrans1D3" presStyleIdx="3" presStyleCnt="4"/>
       <dgm:spPr/>
     </dgm:pt>
     <dgm:pt modelId="{5D098A2A-C6E7-4677-8D18-FC7EF6C8214E}" type="pres">
@@ -2220,11 +2184,11 @@
       <dgm:spPr/>
     </dgm:pt>
     <dgm:pt modelId="{F515E470-14CD-4219-BD55-528DB53E044B}" type="pres">
-      <dgm:prSet presAssocID="{2FEC1185-E18D-4E10-8425-55D856F2DA1B}" presName="background3" presStyleLbl="node3" presStyleIdx="3" presStyleCnt="5"/>
+      <dgm:prSet presAssocID="{2FEC1185-E18D-4E10-8425-55D856F2DA1B}" presName="background3" presStyleLbl="node3" presStyleIdx="3" presStyleCnt="4"/>
       <dgm:spPr/>
     </dgm:pt>
     <dgm:pt modelId="{F329F9BC-CD12-4ABC-9FC9-173BE5DA127C}" type="pres">
-      <dgm:prSet presAssocID="{2FEC1185-E18D-4E10-8425-55D856F2DA1B}" presName="text3" presStyleLbl="fgAcc3" presStyleIdx="3" presStyleCnt="5">
+      <dgm:prSet presAssocID="{2FEC1185-E18D-4E10-8425-55D856F2DA1B}" presName="text3" presStyleLbl="fgAcc3" presStyleIdx="3" presStyleCnt="4">
         <dgm:presLayoutVars>
           <dgm:chPref val="3"/>
         </dgm:presLayoutVars>
@@ -2252,7 +2216,7 @@
       <dgm:spPr/>
     </dgm:pt>
     <dgm:pt modelId="{9B8339BA-25B6-4CC3-8B89-EBB6912129DF}" type="pres">
-      <dgm:prSet presAssocID="{8B465D99-4BC9-4AFA-BB1E-C8F2697F28DB}" presName="text2" presStyleLbl="fgAcc2" presStyleIdx="2" presStyleCnt="3" custLinFactNeighborX="596">
+      <dgm:prSet presAssocID="{8B465D99-4BC9-4AFA-BB1E-C8F2697F28DB}" presName="text2" presStyleLbl="fgAcc2" presStyleIdx="2" presStyleCnt="3" custLinFactNeighborX="30694">
         <dgm:presLayoutVars>
           <dgm:chPref val="3"/>
         </dgm:presLayoutVars>
@@ -2261,34 +2225,6 @@
     </dgm:pt>
     <dgm:pt modelId="{97A077EE-DC82-485D-9D48-357E875CA805}" type="pres">
       <dgm:prSet presAssocID="{8B465D99-4BC9-4AFA-BB1E-C8F2697F28DB}" presName="hierChild3" presStyleCnt="0"/>
-      <dgm:spPr/>
-    </dgm:pt>
-    <dgm:pt modelId="{96123D07-5745-4F83-AC9A-2CD9DD13F963}" type="pres">
-      <dgm:prSet presAssocID="{C9845EFB-3AF7-4ADB-ACE6-76B3B4493422}" presName="Name17" presStyleLbl="parChTrans1D3" presStyleIdx="4" presStyleCnt="5"/>
-      <dgm:spPr/>
-    </dgm:pt>
-    <dgm:pt modelId="{D7E14818-53D6-4F79-95B5-6EAE42A6224D}" type="pres">
-      <dgm:prSet presAssocID="{52E09203-1DBD-4088-8B39-7EBDE8A229DB}" presName="hierRoot3" presStyleCnt="0"/>
-      <dgm:spPr/>
-    </dgm:pt>
-    <dgm:pt modelId="{8EB10B56-8638-46AA-9D8E-706A3B90BA17}" type="pres">
-      <dgm:prSet presAssocID="{52E09203-1DBD-4088-8B39-7EBDE8A229DB}" presName="composite3" presStyleCnt="0"/>
-      <dgm:spPr/>
-    </dgm:pt>
-    <dgm:pt modelId="{8686607E-7FC0-44A2-85C3-F20088DD5A9F}" type="pres">
-      <dgm:prSet presAssocID="{52E09203-1DBD-4088-8B39-7EBDE8A229DB}" presName="background3" presStyleLbl="node3" presStyleIdx="4" presStyleCnt="5"/>
-      <dgm:spPr/>
-    </dgm:pt>
-    <dgm:pt modelId="{83801248-6BC8-4731-9B1E-5A67DD3064DB}" type="pres">
-      <dgm:prSet presAssocID="{52E09203-1DBD-4088-8B39-7EBDE8A229DB}" presName="text3" presStyleLbl="fgAcc3" presStyleIdx="4" presStyleCnt="5">
-        <dgm:presLayoutVars>
-          <dgm:chPref val="3"/>
-        </dgm:presLayoutVars>
-      </dgm:prSet>
-      <dgm:spPr/>
-    </dgm:pt>
-    <dgm:pt modelId="{7AC58503-1830-4E54-8DC9-54AA19C34033}" type="pres">
-      <dgm:prSet presAssocID="{52E09203-1DBD-4088-8B39-7EBDE8A229DB}" presName="hierChild4" presStyleCnt="0"/>
       <dgm:spPr/>
     </dgm:pt>
   </dgm:ptLst>
@@ -2300,7 +2236,6 @@
     <dgm:cxn modelId="{700F843C-7788-4E7D-9534-2A9964FD6CFE}" type="presOf" srcId="{8055A85D-2B17-4846-A250-B279259797C6}" destId="{E3449510-CAB7-4FB6-A2DE-9FAA25E019D2}" srcOrd="0" destOrd="0" presId="urn:microsoft.com/office/officeart/2005/8/layout/hierarchy1"/>
     <dgm:cxn modelId="{0D324C3E-55B2-4CE7-B165-9A2C44CF1E44}" type="presOf" srcId="{37D255CB-535A-497F-B5D2-5D983BB9EDC8}" destId="{89921319-62D0-4598-91DF-003C1E880BE1}" srcOrd="0" destOrd="0" presId="urn:microsoft.com/office/officeart/2005/8/layout/hierarchy1"/>
     <dgm:cxn modelId="{35DA713F-F516-4238-8E70-3B3B375BA21E}" type="presOf" srcId="{8B465D99-4BC9-4AFA-BB1E-C8F2697F28DB}" destId="{9B8339BA-25B6-4CC3-8B89-EBB6912129DF}" srcOrd="0" destOrd="0" presId="urn:microsoft.com/office/officeart/2005/8/layout/hierarchy1"/>
-    <dgm:cxn modelId="{D723CC6F-2B70-4C18-A45C-498B16FFA09A}" srcId="{8B465D99-4BC9-4AFA-BB1E-C8F2697F28DB}" destId="{52E09203-1DBD-4088-8B39-7EBDE8A229DB}" srcOrd="0" destOrd="0" parTransId="{C9845EFB-3AF7-4ADB-ACE6-76B3B4493422}" sibTransId="{54E1F52E-98C3-4BA6-8994-381CB972FA2D}"/>
     <dgm:cxn modelId="{CD319E70-F764-4BB5-B6BA-E9CF2655956D}" srcId="{53FA7F5E-9B1A-4365-9EB8-0054070003BB}" destId="{9C06066B-FEF3-4E6A-96BE-FA058FC0BAB7}" srcOrd="0" destOrd="0" parTransId="{B48CF68D-5554-4089-A642-A8449DBC6E3F}" sibTransId="{BAFEB2D8-BCF0-4D0B-ACAB-C824F458508B}"/>
     <dgm:cxn modelId="{E32ADA56-CABA-4D26-B410-45211D412B58}" type="presOf" srcId="{6A6135B9-7FB0-4196-933D-BE93268A199F}" destId="{3CF24D22-C763-4B0A-8619-B073B24FBCB3}" srcOrd="0" destOrd="0" presId="urn:microsoft.com/office/officeart/2005/8/layout/hierarchy1"/>
     <dgm:cxn modelId="{73E63D77-2B2B-4F8D-B4B6-890CBF87725C}" type="presOf" srcId="{E5A0807B-A9B3-4B88-B050-17F109D3E52D}" destId="{92DCB8DF-CCB4-441D-AA4C-2673257D8E97}" srcOrd="0" destOrd="0" presId="urn:microsoft.com/office/officeart/2005/8/layout/hierarchy1"/>
@@ -2308,7 +2243,6 @@
     <dgm:cxn modelId="{1C01397A-CF68-4012-8CE3-AE83A9B43836}" type="presOf" srcId="{EB287531-8730-4B5D-9381-0AEA4C97CD15}" destId="{5442838E-007B-4CD2-834A-670B44EB0B76}" srcOrd="0" destOrd="0" presId="urn:microsoft.com/office/officeart/2005/8/layout/hierarchy1"/>
     <dgm:cxn modelId="{5B02B18A-01C5-4C06-A0C9-A05EA371899B}" srcId="{8045F032-DAC8-4C7B-AFBC-51EC7D0B3FA2}" destId="{1D47B408-2953-4891-AD88-1A326D85A6EE}" srcOrd="0" destOrd="0" parTransId="{46AC8AD3-4C41-4AD2-BB1C-B39966A90453}" sibTransId="{B7FC521E-AD8D-45BE-8338-3164EC2B9949}"/>
     <dgm:cxn modelId="{48E7788B-50A2-480D-AA44-FA30448A1488}" type="presOf" srcId="{1D47B408-2953-4891-AD88-1A326D85A6EE}" destId="{40359719-29DB-4B64-B983-3671E1C251AC}" srcOrd="0" destOrd="0" presId="urn:microsoft.com/office/officeart/2005/8/layout/hierarchy1"/>
-    <dgm:cxn modelId="{D019F992-FAB3-4F2F-95A4-A18993A795C6}" type="presOf" srcId="{C9845EFB-3AF7-4ADB-ACE6-76B3B4493422}" destId="{96123D07-5745-4F83-AC9A-2CD9DD13F963}" srcOrd="0" destOrd="0" presId="urn:microsoft.com/office/officeart/2005/8/layout/hierarchy1"/>
     <dgm:cxn modelId="{EA681FA5-EE96-4827-BE43-DF7BEF759DB6}" type="presOf" srcId="{2FEC1185-E18D-4E10-8425-55D856F2DA1B}" destId="{F329F9BC-CD12-4ABC-9FC9-173BE5DA127C}" srcOrd="0" destOrd="0" presId="urn:microsoft.com/office/officeart/2005/8/layout/hierarchy1"/>
     <dgm:cxn modelId="{9E24D6A7-C514-4792-B79D-B947FB213834}" type="presOf" srcId="{EF45CBAD-5489-4A11-B7D5-1BF89C976CD6}" destId="{501ECA39-7506-4EA3-98FA-BBA1AD178BBE}" srcOrd="0" destOrd="0" presId="urn:microsoft.com/office/officeart/2005/8/layout/hierarchy1"/>
     <dgm:cxn modelId="{14E4C0A9-C974-494A-841D-27986DB32FB9}" srcId="{9C06066B-FEF3-4E6A-96BE-FA058FC0BAB7}" destId="{8045F032-DAC8-4C7B-AFBC-51EC7D0B3FA2}" srcOrd="1" destOrd="0" parTransId="{8055A85D-2B17-4846-A250-B279259797C6}" sibTransId="{BD682B89-D05A-4951-A0C2-CFBE13B550AB}"/>
@@ -2316,7 +2250,6 @@
     <dgm:cxn modelId="{D303A5CC-2D48-412D-849D-79AB765490CE}" type="presOf" srcId="{9C06066B-FEF3-4E6A-96BE-FA058FC0BAB7}" destId="{BF40D2FA-BA4D-4599-85D7-0C73F43D1EF8}" srcOrd="0" destOrd="0" presId="urn:microsoft.com/office/officeart/2005/8/layout/hierarchy1"/>
     <dgm:cxn modelId="{4E2BB7CE-A8E1-4E80-9587-48CE6DF2CAF0}" srcId="{E5A0807B-A9B3-4B88-B050-17F109D3E52D}" destId="{EF45CBAD-5489-4A11-B7D5-1BF89C976CD6}" srcOrd="1" destOrd="0" parTransId="{EB287531-8730-4B5D-9381-0AEA4C97CD15}" sibTransId="{CFEE6D2A-B774-4896-BF48-8ABDD0442A47}"/>
     <dgm:cxn modelId="{094661DC-1D04-4B42-BBE6-3F6D8838B241}" type="presOf" srcId="{46AC8AD3-4C41-4AD2-BB1C-B39966A90453}" destId="{1F4C009B-DA2F-4EDD-9318-D0273BB07D3B}" srcOrd="0" destOrd="0" presId="urn:microsoft.com/office/officeart/2005/8/layout/hierarchy1"/>
-    <dgm:cxn modelId="{CD3F5FDF-2D8D-441E-A820-56338CA9D81C}" type="presOf" srcId="{52E09203-1DBD-4088-8B39-7EBDE8A229DB}" destId="{83801248-6BC8-4731-9B1E-5A67DD3064DB}" srcOrd="0" destOrd="0" presId="urn:microsoft.com/office/officeart/2005/8/layout/hierarchy1"/>
     <dgm:cxn modelId="{5D473DE0-57DD-4611-B234-4F6046F01610}" type="presOf" srcId="{8F716C72-7EA3-4032-AB4B-315D57747253}" destId="{F2DCA186-0CE9-4587-A2A7-5F67FE2A0344}" srcOrd="0" destOrd="0" presId="urn:microsoft.com/office/officeart/2005/8/layout/hierarchy1"/>
     <dgm:cxn modelId="{4CF97FE6-7DFB-4D17-8B8B-8A6E59722169}" type="presOf" srcId="{8045F032-DAC8-4C7B-AFBC-51EC7D0B3FA2}" destId="{90FD6A9C-48CF-4B27-A351-9CF3411A41F4}" srcOrd="0" destOrd="0" presId="urn:microsoft.com/office/officeart/2005/8/layout/hierarchy1"/>
     <dgm:cxn modelId="{713671EE-F342-4C86-BFA8-183BD3CFCB6B}" srcId="{9C06066B-FEF3-4E6A-96BE-FA058FC0BAB7}" destId="{E5A0807B-A9B3-4B88-B050-17F109D3E52D}" srcOrd="0" destOrd="0" parTransId="{B15C3DAD-9510-40AA-9FAF-A02D612BCBF6}" sibTransId="{DEF81498-814F-4209-B376-F0DCEC3E04D6}"/>
@@ -2367,12 +2300,6 @@
     <dgm:cxn modelId="{50C5E9DA-ED94-406B-AC7F-7A656FDD8779}" type="presParOf" srcId="{A591E101-87DB-4903-9052-FBB2ED7466BA}" destId="{0DED723F-F49C-4CB1-8CC9-FFD46C0C7496}" srcOrd="0" destOrd="0" presId="urn:microsoft.com/office/officeart/2005/8/layout/hierarchy1"/>
     <dgm:cxn modelId="{42B96B52-EF07-4199-85E1-B8F18AA82148}" type="presParOf" srcId="{A591E101-87DB-4903-9052-FBB2ED7466BA}" destId="{9B8339BA-25B6-4CC3-8B89-EBB6912129DF}" srcOrd="1" destOrd="0" presId="urn:microsoft.com/office/officeart/2005/8/layout/hierarchy1"/>
     <dgm:cxn modelId="{DB81D347-9B5B-4AB6-A780-7326089765DB}" type="presParOf" srcId="{EF7326DA-8E16-4FF6-AE5F-4A809E8EC2BD}" destId="{97A077EE-DC82-485D-9D48-357E875CA805}" srcOrd="1" destOrd="0" presId="urn:microsoft.com/office/officeart/2005/8/layout/hierarchy1"/>
-    <dgm:cxn modelId="{6CD3498C-9090-4055-A334-B086CF62E9B5}" type="presParOf" srcId="{97A077EE-DC82-485D-9D48-357E875CA805}" destId="{96123D07-5745-4F83-AC9A-2CD9DD13F963}" srcOrd="0" destOrd="0" presId="urn:microsoft.com/office/officeart/2005/8/layout/hierarchy1"/>
-    <dgm:cxn modelId="{338C95D7-0C81-4909-A068-5F6747219566}" type="presParOf" srcId="{97A077EE-DC82-485D-9D48-357E875CA805}" destId="{D7E14818-53D6-4F79-95B5-6EAE42A6224D}" srcOrd="1" destOrd="0" presId="urn:microsoft.com/office/officeart/2005/8/layout/hierarchy1"/>
-    <dgm:cxn modelId="{584471D5-6E87-4B6D-ADCF-C6005D2FE2BD}" type="presParOf" srcId="{D7E14818-53D6-4F79-95B5-6EAE42A6224D}" destId="{8EB10B56-8638-46AA-9D8E-706A3B90BA17}" srcOrd="0" destOrd="0" presId="urn:microsoft.com/office/officeart/2005/8/layout/hierarchy1"/>
-    <dgm:cxn modelId="{C237EEFF-984B-40C1-91AC-402CE58999DF}" type="presParOf" srcId="{8EB10B56-8638-46AA-9D8E-706A3B90BA17}" destId="{8686607E-7FC0-44A2-85C3-F20088DD5A9F}" srcOrd="0" destOrd="0" presId="urn:microsoft.com/office/officeart/2005/8/layout/hierarchy1"/>
-    <dgm:cxn modelId="{481FDD2A-3F32-4A91-8462-194342B016F6}" type="presParOf" srcId="{8EB10B56-8638-46AA-9D8E-706A3B90BA17}" destId="{83801248-6BC8-4731-9B1E-5A67DD3064DB}" srcOrd="1" destOrd="0" presId="urn:microsoft.com/office/officeart/2005/8/layout/hierarchy1"/>
-    <dgm:cxn modelId="{3705F380-CBEA-4E98-8225-D63AFABDEC79}" type="presParOf" srcId="{D7E14818-53D6-4F79-95B5-6EAE42A6224D}" destId="{7AC58503-1830-4E54-8DC9-54AA19C34033}" srcOrd="1" destOrd="0" presId="urn:microsoft.com/office/officeart/2005/8/layout/hierarchy1"/>
   </dgm:cxnLst>
   <dgm:bg/>
   <dgm:whole/>
@@ -2392,67 +2319,6 @@
       <dsp:cNvGrpSpPr/>
     </dsp:nvGrpSpPr>
     <dsp:grpSpPr/>
-    <dsp:sp modelId="{96123D07-5745-4F83-AC9A-2CD9DD13F963}">
-      <dsp:nvSpPr>
-        <dsp:cNvPr id="0" name=""/>
-        <dsp:cNvSpPr/>
-      </dsp:nvSpPr>
-      <dsp:spPr>
-        <a:xfrm>
-          <a:off x="7499478" y="3072389"/>
-          <a:ext cx="91440" cy="407052"/>
-        </a:xfrm>
-        <a:custGeom>
-          <a:avLst/>
-          <a:gdLst/>
-          <a:ahLst/>
-          <a:cxnLst/>
-          <a:rect l="0" t="0" r="0" b="0"/>
-          <a:pathLst>
-            <a:path>
-              <a:moveTo>
-                <a:pt x="48592" y="0"/>
-              </a:moveTo>
-              <a:lnTo>
-                <a:pt x="48592" y="277394"/>
-              </a:lnTo>
-              <a:lnTo>
-                <a:pt x="45720" y="277394"/>
-              </a:lnTo>
-              <a:lnTo>
-                <a:pt x="45720" y="407052"/>
-              </a:lnTo>
-            </a:path>
-          </a:pathLst>
-        </a:custGeom>
-        <a:noFill/>
-        <a:ln w="19050" cap="flat" cmpd="sng" algn="ctr">
-          <a:solidFill>
-            <a:schemeClr val="accent1">
-              <a:shade val="80000"/>
-              <a:hueOff val="0"/>
-              <a:satOff val="0"/>
-              <a:lumOff val="0"/>
-              <a:alphaOff val="0"/>
-            </a:schemeClr>
-          </a:solidFill>
-          <a:prstDash val="solid"/>
-        </a:ln>
-        <a:effectLst/>
-      </dsp:spPr>
-      <dsp:style>
-        <a:lnRef idx="2">
-          <a:scrgbClr r="0" g="0" b="0"/>
-        </a:lnRef>
-        <a:fillRef idx="0">
-          <a:scrgbClr r="0" g="0" b="0"/>
-        </a:fillRef>
-        <a:effectRef idx="0">
-          <a:scrgbClr r="0" g="0" b="0"/>
-        </a:effectRef>
-        <a:fontRef idx="minor"/>
-      </dsp:style>
-    </dsp:sp>
     <dsp:sp modelId="{89921319-62D0-4598-91DF-003C1E880BE1}">
       <dsp:nvSpPr>
         <dsp:cNvPr id="0" name=""/>
@@ -2460,8 +2326,8 @@
       </dsp:nvSpPr>
       <dsp:spPr>
         <a:xfrm>
-          <a:off x="4117114" y="1455445"/>
-          <a:ext cx="3430955" cy="728193"/>
+          <a:off x="4107518" y="1314029"/>
+          <a:ext cx="3343510" cy="810811"/>
         </a:xfrm>
         <a:custGeom>
           <a:avLst/>
@@ -2475,13 +2341,13 @@
                 <a:pt x="0" y="0"/>
               </a:moveTo>
               <a:lnTo>
-                <a:pt x="0" y="598535"/>
+                <a:pt x="0" y="666443"/>
               </a:lnTo>
               <a:lnTo>
-                <a:pt x="3430955" y="598535"/>
+                <a:pt x="3343510" y="666443"/>
               </a:lnTo>
               <a:lnTo>
-                <a:pt x="3430955" y="728193"/>
+                <a:pt x="3343510" y="810811"/>
               </a:lnTo>
             </a:path>
           </a:pathLst>
@@ -2521,8 +2387,8 @@
       </dsp:nvSpPr>
       <dsp:spPr>
         <a:xfrm>
-          <a:off x="5004277" y="3066061"/>
-          <a:ext cx="830290" cy="413380"/>
+          <a:off x="5571513" y="3107380"/>
+          <a:ext cx="924492" cy="460280"/>
         </a:xfrm>
         <a:custGeom>
           <a:avLst/>
@@ -2536,13 +2402,13 @@
                 <a:pt x="0" y="0"/>
               </a:moveTo>
               <a:lnTo>
-                <a:pt x="0" y="283722"/>
+                <a:pt x="0" y="315912"/>
               </a:lnTo>
               <a:lnTo>
-                <a:pt x="830290" y="283722"/>
+                <a:pt x="924492" y="315912"/>
               </a:lnTo>
               <a:lnTo>
-                <a:pt x="830290" y="413380"/>
+                <a:pt x="924492" y="460280"/>
               </a:lnTo>
             </a:path>
           </a:pathLst>
@@ -2582,8 +2448,8 @@
       </dsp:nvSpPr>
       <dsp:spPr>
         <a:xfrm>
-          <a:off x="4123937" y="3066061"/>
-          <a:ext cx="880340" cy="413380"/>
+          <a:off x="4591293" y="3107380"/>
+          <a:ext cx="980220" cy="460280"/>
         </a:xfrm>
         <a:custGeom>
           <a:avLst/>
@@ -2594,16 +2460,16 @@
           <a:pathLst>
             <a:path>
               <a:moveTo>
-                <a:pt x="880340" y="0"/>
+                <a:pt x="980220" y="0"/>
               </a:moveTo>
               <a:lnTo>
-                <a:pt x="880340" y="283722"/>
+                <a:pt x="980220" y="315912"/>
               </a:lnTo>
               <a:lnTo>
-                <a:pt x="0" y="283722"/>
+                <a:pt x="0" y="315912"/>
               </a:lnTo>
               <a:lnTo>
-                <a:pt x="0" y="413380"/>
+                <a:pt x="0" y="460280"/>
               </a:lnTo>
             </a:path>
           </a:pathLst>
@@ -2643,8 +2509,8 @@
       </dsp:nvSpPr>
       <dsp:spPr>
         <a:xfrm>
-          <a:off x="4117114" y="1455445"/>
-          <a:ext cx="887162" cy="721865"/>
+          <a:off x="4107518" y="1314029"/>
+          <a:ext cx="1463995" cy="803765"/>
         </a:xfrm>
         <a:custGeom>
           <a:avLst/>
@@ -2658,13 +2524,13 @@
                 <a:pt x="0" y="0"/>
               </a:moveTo>
               <a:lnTo>
-                <a:pt x="0" y="592207"/>
+                <a:pt x="0" y="659397"/>
               </a:lnTo>
               <a:lnTo>
-                <a:pt x="887162" y="592207"/>
+                <a:pt x="1463995" y="659397"/>
               </a:lnTo>
               <a:lnTo>
-                <a:pt x="887162" y="721865"/>
+                <a:pt x="1463995" y="803765"/>
               </a:lnTo>
             </a:path>
           </a:pathLst>
@@ -2704,8 +2570,8 @@
       </dsp:nvSpPr>
       <dsp:spPr>
         <a:xfrm>
-          <a:off x="1557991" y="3072389"/>
-          <a:ext cx="855315" cy="407052"/>
+          <a:off x="1734224" y="3114425"/>
+          <a:ext cx="952356" cy="453235"/>
         </a:xfrm>
         <a:custGeom>
           <a:avLst/>
@@ -2719,13 +2585,13 @@
                 <a:pt x="0" y="0"/>
               </a:moveTo>
               <a:lnTo>
-                <a:pt x="0" y="277394"/>
+                <a:pt x="0" y="308866"/>
               </a:lnTo>
               <a:lnTo>
-                <a:pt x="855315" y="277394"/>
+                <a:pt x="952356" y="308866"/>
               </a:lnTo>
               <a:lnTo>
-                <a:pt x="855315" y="407052"/>
+                <a:pt x="952356" y="453235"/>
               </a:lnTo>
             </a:path>
           </a:pathLst>
@@ -2765,8 +2631,8 @@
       </dsp:nvSpPr>
       <dsp:spPr>
         <a:xfrm>
-          <a:off x="702675" y="3072389"/>
-          <a:ext cx="855315" cy="407052"/>
+          <a:off x="781867" y="3114425"/>
+          <a:ext cx="952356" cy="453235"/>
         </a:xfrm>
         <a:custGeom>
           <a:avLst/>
@@ -2777,16 +2643,16 @@
           <a:pathLst>
             <a:path>
               <a:moveTo>
-                <a:pt x="855315" y="0"/>
+                <a:pt x="952356" y="0"/>
               </a:moveTo>
               <a:lnTo>
-                <a:pt x="855315" y="277394"/>
+                <a:pt x="952356" y="308866"/>
               </a:lnTo>
               <a:lnTo>
-                <a:pt x="0" y="277394"/>
+                <a:pt x="0" y="308866"/>
               </a:lnTo>
               <a:lnTo>
-                <a:pt x="0" y="407052"/>
+                <a:pt x="0" y="453235"/>
               </a:lnTo>
             </a:path>
           </a:pathLst>
@@ -2826,8 +2692,8 @@
       </dsp:nvSpPr>
       <dsp:spPr>
         <a:xfrm>
-          <a:off x="1557991" y="1455445"/>
-          <a:ext cx="2559123" cy="728193"/>
+          <a:off x="1734224" y="1314029"/>
+          <a:ext cx="2373294" cy="810811"/>
         </a:xfrm>
         <a:custGeom>
           <a:avLst/>
@@ -2838,16 +2704,16 @@
           <a:pathLst>
             <a:path>
               <a:moveTo>
-                <a:pt x="2559123" y="0"/>
+                <a:pt x="2373294" y="0"/>
               </a:moveTo>
               <a:lnTo>
-                <a:pt x="2559123" y="598535"/>
+                <a:pt x="2373294" y="666443"/>
               </a:lnTo>
               <a:lnTo>
-                <a:pt x="0" y="598535"/>
+                <a:pt x="0" y="666443"/>
               </a:lnTo>
               <a:lnTo>
-                <a:pt x="0" y="728193"/>
+                <a:pt x="0" y="810811"/>
               </a:lnTo>
             </a:path>
           </a:pathLst>
@@ -2887,8 +2753,8 @@
       </dsp:nvSpPr>
       <dsp:spPr>
         <a:xfrm>
-          <a:off x="3417311" y="566695"/>
-          <a:ext cx="1399606" cy="888750"/>
+          <a:off x="3328318" y="324444"/>
+          <a:ext cx="1558401" cy="989584"/>
         </a:xfrm>
         <a:prstGeom prst="roundRect">
           <a:avLst>
@@ -2944,8 +2810,8 @@
       </dsp:nvSpPr>
       <dsp:spPr>
         <a:xfrm>
-          <a:off x="3572823" y="714431"/>
-          <a:ext cx="1399606" cy="888750"/>
+          <a:off x="3501473" y="488942"/>
+          <a:ext cx="1558401" cy="989584"/>
         </a:xfrm>
         <a:prstGeom prst="roundRect">
           <a:avLst>
@@ -2987,12 +2853,12 @@
         <a:fontRef idx="minor"/>
       </dsp:style>
       <dsp:txBody>
-        <a:bodyPr spcFirstLastPara="0" vert="horz" wrap="square" lIns="53340" tIns="53340" rIns="53340" bIns="53340" numCol="1" spcCol="1270" anchor="ctr" anchorCtr="0">
+        <a:bodyPr spcFirstLastPara="0" vert="horz" wrap="square" lIns="60960" tIns="60960" rIns="60960" bIns="60960" numCol="1" spcCol="1270" anchor="ctr" anchorCtr="0">
           <a:noAutofit/>
         </a:bodyPr>
         <a:lstStyle/>
         <a:p>
-          <a:pPr marL="0" lvl="0" indent="0" algn="ctr" defTabSz="622300">
+          <a:pPr marL="0" lvl="0" indent="0" algn="ctr" defTabSz="711200">
             <a:lnSpc>
               <a:spcPct val="90000"/>
             </a:lnSpc>
@@ -3005,14 +2871,14 @@
             <a:buNone/>
           </a:pPr>
           <a:r>
-            <a:rPr lang="en-US" sz="1400" kern="1200" dirty="0"/>
+            <a:rPr lang="en-US" sz="1600" kern="1200" dirty="0"/>
             <a:t>Machine Learning</a:t>
           </a:r>
         </a:p>
       </dsp:txBody>
       <dsp:txXfrm>
-        <a:off x="3598854" y="740462"/>
-        <a:ext cx="1347544" cy="836688"/>
+        <a:off x="3530457" y="517926"/>
+        <a:ext cx="1500433" cy="931616"/>
       </dsp:txXfrm>
     </dsp:sp>
     <dsp:sp modelId="{C87BB537-185A-49D0-A558-9BE3C980E3C5}">
@@ -3022,8 +2888,8 @@
       </dsp:nvSpPr>
       <dsp:spPr>
         <a:xfrm>
-          <a:off x="858187" y="2183639"/>
-          <a:ext cx="1399606" cy="888750"/>
+          <a:off x="955023" y="2124841"/>
+          <a:ext cx="1558401" cy="989584"/>
         </a:xfrm>
         <a:prstGeom prst="roundRect">
           <a:avLst>
@@ -3079,8 +2945,8 @@
       </dsp:nvSpPr>
       <dsp:spPr>
         <a:xfrm>
-          <a:off x="1013699" y="2331375"/>
-          <a:ext cx="1399606" cy="888750"/>
+          <a:off x="1128179" y="2289339"/>
+          <a:ext cx="1558401" cy="989584"/>
         </a:xfrm>
         <a:prstGeom prst="roundRect">
           <a:avLst>
@@ -3122,12 +2988,12 @@
         <a:fontRef idx="minor"/>
       </dsp:style>
       <dsp:txBody>
-        <a:bodyPr spcFirstLastPara="0" vert="horz" wrap="square" lIns="53340" tIns="53340" rIns="53340" bIns="53340" numCol="1" spcCol="1270" anchor="ctr" anchorCtr="0">
+        <a:bodyPr spcFirstLastPara="0" vert="horz" wrap="square" lIns="60960" tIns="60960" rIns="60960" bIns="60960" numCol="1" spcCol="1270" anchor="ctr" anchorCtr="0">
           <a:noAutofit/>
         </a:bodyPr>
         <a:lstStyle/>
         <a:p>
-          <a:pPr marL="0" lvl="0" indent="0" algn="ctr" defTabSz="622300">
+          <a:pPr marL="0" lvl="0" indent="0" algn="ctr" defTabSz="711200">
             <a:lnSpc>
               <a:spcPct val="90000"/>
             </a:lnSpc>
@@ -3140,14 +3006,14 @@
             <a:buNone/>
           </a:pPr>
           <a:r>
-            <a:rPr lang="en-US" sz="1400" kern="1200" dirty="0"/>
+            <a:rPr lang="en-US" sz="1600" kern="1200" dirty="0"/>
             <a:t>Supervised learning</a:t>
           </a:r>
         </a:p>
       </dsp:txBody>
       <dsp:txXfrm>
-        <a:off x="1039730" y="2357406"/>
-        <a:ext cx="1347544" cy="836688"/>
+        <a:off x="1157163" y="2318323"/>
+        <a:ext cx="1500433" cy="931616"/>
       </dsp:txXfrm>
     </dsp:sp>
     <dsp:sp modelId="{940B7AEA-E53B-4C88-A840-459AEB6D54A6}">
@@ -3157,8 +3023,8 @@
       </dsp:nvSpPr>
       <dsp:spPr>
         <a:xfrm>
-          <a:off x="2872" y="3479441"/>
-          <a:ext cx="1399606" cy="888750"/>
+          <a:off x="2667" y="3567661"/>
+          <a:ext cx="1558401" cy="989584"/>
         </a:xfrm>
         <a:prstGeom prst="roundRect">
           <a:avLst>
@@ -3214,8 +3080,8 @@
       </dsp:nvSpPr>
       <dsp:spPr>
         <a:xfrm>
-          <a:off x="158384" y="3627178"/>
-          <a:ext cx="1399606" cy="888750"/>
+          <a:off x="175822" y="3732158"/>
+          <a:ext cx="1558401" cy="989584"/>
         </a:xfrm>
         <a:prstGeom prst="roundRect">
           <a:avLst>
@@ -3257,12 +3123,12 @@
         <a:fontRef idx="minor"/>
       </dsp:style>
       <dsp:txBody>
-        <a:bodyPr spcFirstLastPara="0" vert="horz" wrap="square" lIns="53340" tIns="53340" rIns="53340" bIns="53340" numCol="1" spcCol="1270" anchor="ctr" anchorCtr="0">
+        <a:bodyPr spcFirstLastPara="0" vert="horz" wrap="square" lIns="60960" tIns="60960" rIns="60960" bIns="60960" numCol="1" spcCol="1270" anchor="ctr" anchorCtr="0">
           <a:noAutofit/>
         </a:bodyPr>
         <a:lstStyle/>
         <a:p>
-          <a:pPr marL="0" lvl="0" indent="0" algn="ctr" defTabSz="622300">
+          <a:pPr marL="0" lvl="0" indent="0" algn="ctr" defTabSz="711200">
             <a:lnSpc>
               <a:spcPct val="90000"/>
             </a:lnSpc>
@@ -3275,14 +3141,14 @@
             <a:buNone/>
           </a:pPr>
           <a:r>
-            <a:rPr lang="en-US" sz="1400" kern="1200" dirty="0"/>
+            <a:rPr lang="en-US" sz="1600" kern="1200" dirty="0"/>
             <a:t>Regression</a:t>
           </a:r>
         </a:p>
       </dsp:txBody>
       <dsp:txXfrm>
-        <a:off x="184415" y="3653209"/>
-        <a:ext cx="1347544" cy="836688"/>
+        <a:off x="204806" y="3761142"/>
+        <a:ext cx="1500433" cy="931616"/>
       </dsp:txXfrm>
     </dsp:sp>
     <dsp:sp modelId="{DAA0D212-4225-4579-AF2F-1ED1008247EA}">
@@ -3292,8 +3158,8 @@
       </dsp:nvSpPr>
       <dsp:spPr>
         <a:xfrm>
-          <a:off x="1713502" y="3479441"/>
-          <a:ext cx="1399606" cy="888750"/>
+          <a:off x="1907379" y="3567661"/>
+          <a:ext cx="1558401" cy="989584"/>
         </a:xfrm>
         <a:prstGeom prst="roundRect">
           <a:avLst>
@@ -3349,8 +3215,8 @@
       </dsp:nvSpPr>
       <dsp:spPr>
         <a:xfrm>
-          <a:off x="1869014" y="3627178"/>
-          <a:ext cx="1399606" cy="888750"/>
+          <a:off x="2080535" y="3732158"/>
+          <a:ext cx="1558401" cy="989584"/>
         </a:xfrm>
         <a:prstGeom prst="roundRect">
           <a:avLst>
@@ -3392,12 +3258,12 @@
         <a:fontRef idx="minor"/>
       </dsp:style>
       <dsp:txBody>
-        <a:bodyPr spcFirstLastPara="0" vert="horz" wrap="square" lIns="53340" tIns="53340" rIns="53340" bIns="53340" numCol="1" spcCol="1270" anchor="ctr" anchorCtr="0">
+        <a:bodyPr spcFirstLastPara="0" vert="horz" wrap="square" lIns="60960" tIns="60960" rIns="60960" bIns="60960" numCol="1" spcCol="1270" anchor="ctr" anchorCtr="0">
           <a:noAutofit/>
         </a:bodyPr>
         <a:lstStyle/>
         <a:p>
-          <a:pPr marL="0" lvl="0" indent="0" algn="ctr" defTabSz="622300">
+          <a:pPr marL="0" lvl="0" indent="0" algn="ctr" defTabSz="711200">
             <a:lnSpc>
               <a:spcPct val="90000"/>
             </a:lnSpc>
@@ -3410,14 +3276,14 @@
             <a:buNone/>
           </a:pPr>
           <a:r>
-            <a:rPr lang="en-US" sz="1400" kern="1200" dirty="0"/>
+            <a:rPr lang="en-US" sz="1600" kern="1200" dirty="0"/>
             <a:t>Classification</a:t>
           </a:r>
         </a:p>
       </dsp:txBody>
       <dsp:txXfrm>
-        <a:off x="1895045" y="3653209"/>
-        <a:ext cx="1347544" cy="836688"/>
+        <a:off x="2109519" y="3761142"/>
+        <a:ext cx="1500433" cy="931616"/>
       </dsp:txXfrm>
     </dsp:sp>
     <dsp:sp modelId="{6186ABAF-F378-4B7C-A449-0924F95FC875}">
@@ -3427,8 +3293,8 @@
       </dsp:nvSpPr>
       <dsp:spPr>
         <a:xfrm>
-          <a:off x="4304473" y="2177311"/>
-          <a:ext cx="1399606" cy="888750"/>
+          <a:off x="4792313" y="2117795"/>
+          <a:ext cx="1558401" cy="989584"/>
         </a:xfrm>
         <a:prstGeom prst="roundRect">
           <a:avLst>
@@ -3484,8 +3350,8 @@
       </dsp:nvSpPr>
       <dsp:spPr>
         <a:xfrm>
-          <a:off x="4459985" y="2325047"/>
-          <a:ext cx="1399606" cy="888750"/>
+          <a:off x="4965468" y="2282293"/>
+          <a:ext cx="1558401" cy="989584"/>
         </a:xfrm>
         <a:prstGeom prst="roundRect">
           <a:avLst>
@@ -3527,12 +3393,12 @@
         <a:fontRef idx="minor"/>
       </dsp:style>
       <dsp:txBody>
-        <a:bodyPr spcFirstLastPara="0" vert="horz" wrap="square" lIns="53340" tIns="53340" rIns="53340" bIns="53340" numCol="1" spcCol="1270" anchor="ctr" anchorCtr="0">
+        <a:bodyPr spcFirstLastPara="0" vert="horz" wrap="square" lIns="60960" tIns="60960" rIns="60960" bIns="60960" numCol="1" spcCol="1270" anchor="ctr" anchorCtr="0">
           <a:noAutofit/>
         </a:bodyPr>
         <a:lstStyle/>
         <a:p>
-          <a:pPr marL="0" lvl="0" indent="0" algn="ctr" defTabSz="622300">
+          <a:pPr marL="0" lvl="0" indent="0" algn="ctr" defTabSz="711200">
             <a:lnSpc>
               <a:spcPct val="90000"/>
             </a:lnSpc>
@@ -3545,14 +3411,14 @@
             <a:buNone/>
           </a:pPr>
           <a:r>
-            <a:rPr lang="en-US" sz="1400" kern="1200" dirty="0"/>
+            <a:rPr lang="en-US" sz="1600" kern="1200" dirty="0"/>
             <a:t>Unsupervised Learning</a:t>
           </a:r>
         </a:p>
       </dsp:txBody>
       <dsp:txXfrm>
-        <a:off x="4486016" y="2351078"/>
-        <a:ext cx="1347544" cy="836688"/>
+        <a:off x="4994452" y="2311277"/>
+        <a:ext cx="1500433" cy="931616"/>
       </dsp:txXfrm>
     </dsp:sp>
     <dsp:sp modelId="{DFD8C324-C6AC-45AC-82A5-0DCCBC87D263}">
@@ -3562,8 +3428,8 @@
       </dsp:nvSpPr>
       <dsp:spPr>
         <a:xfrm>
-          <a:off x="3424133" y="3479441"/>
-          <a:ext cx="1399606" cy="888750"/>
+          <a:off x="3812092" y="3567661"/>
+          <a:ext cx="1558401" cy="989584"/>
         </a:xfrm>
         <a:prstGeom prst="roundRect">
           <a:avLst>
@@ -3619,8 +3485,8 @@
       </dsp:nvSpPr>
       <dsp:spPr>
         <a:xfrm>
-          <a:off x="3579645" y="3627178"/>
-          <a:ext cx="1399606" cy="888750"/>
+          <a:off x="3985248" y="3732158"/>
+          <a:ext cx="1558401" cy="989584"/>
         </a:xfrm>
         <a:prstGeom prst="roundRect">
           <a:avLst>
@@ -3662,12 +3528,12 @@
         <a:fontRef idx="minor"/>
       </dsp:style>
       <dsp:txBody>
-        <a:bodyPr spcFirstLastPara="0" vert="horz" wrap="square" lIns="53340" tIns="53340" rIns="53340" bIns="53340" numCol="1" spcCol="1270" anchor="ctr" anchorCtr="0">
+        <a:bodyPr spcFirstLastPara="0" vert="horz" wrap="square" lIns="60960" tIns="60960" rIns="60960" bIns="60960" numCol="1" spcCol="1270" anchor="ctr" anchorCtr="0">
           <a:noAutofit/>
         </a:bodyPr>
         <a:lstStyle/>
         <a:p>
-          <a:pPr marL="0" lvl="0" indent="0" algn="ctr" defTabSz="622300">
+          <a:pPr marL="0" lvl="0" indent="0" algn="ctr" defTabSz="711200">
             <a:lnSpc>
               <a:spcPct val="90000"/>
             </a:lnSpc>
@@ -3680,14 +3546,14 @@
             <a:buNone/>
           </a:pPr>
           <a:r>
-            <a:rPr lang="en-US" sz="1400" kern="1200" dirty="0"/>
+            <a:rPr lang="en-US" sz="1600" kern="1200" dirty="0"/>
             <a:t>Clustering</a:t>
           </a:r>
         </a:p>
       </dsp:txBody>
       <dsp:txXfrm>
-        <a:off x="3605676" y="3653209"/>
-        <a:ext cx="1347544" cy="836688"/>
+        <a:off x="4014232" y="3761142"/>
+        <a:ext cx="1500433" cy="931616"/>
       </dsp:txXfrm>
     </dsp:sp>
     <dsp:sp modelId="{F515E470-14CD-4219-BD55-528DB53E044B}">
@@ -3697,8 +3563,8 @@
       </dsp:nvSpPr>
       <dsp:spPr>
         <a:xfrm>
-          <a:off x="5134764" y="3479441"/>
-          <a:ext cx="1399606" cy="888750"/>
+          <a:off x="5716805" y="3567661"/>
+          <a:ext cx="1558401" cy="989584"/>
         </a:xfrm>
         <a:prstGeom prst="roundRect">
           <a:avLst>
@@ -3754,8 +3620,8 @@
       </dsp:nvSpPr>
       <dsp:spPr>
         <a:xfrm>
-          <a:off x="5290276" y="3627178"/>
-          <a:ext cx="1399606" cy="888750"/>
+          <a:off x="5889961" y="3732158"/>
+          <a:ext cx="1558401" cy="989584"/>
         </a:xfrm>
         <a:prstGeom prst="roundRect">
           <a:avLst>
@@ -3797,12 +3663,12 @@
         <a:fontRef idx="minor"/>
       </dsp:style>
       <dsp:txBody>
-        <a:bodyPr spcFirstLastPara="0" vert="horz" wrap="square" lIns="53340" tIns="53340" rIns="53340" bIns="53340" numCol="1" spcCol="1270" anchor="ctr" anchorCtr="0">
+        <a:bodyPr spcFirstLastPara="0" vert="horz" wrap="square" lIns="60960" tIns="60960" rIns="60960" bIns="60960" numCol="1" spcCol="1270" anchor="ctr" anchorCtr="0">
           <a:noAutofit/>
         </a:bodyPr>
         <a:lstStyle/>
         <a:p>
-          <a:pPr marL="0" lvl="0" indent="0" algn="ctr" defTabSz="622300">
+          <a:pPr marL="0" lvl="0" indent="0" algn="ctr" defTabSz="711200">
             <a:lnSpc>
               <a:spcPct val="90000"/>
             </a:lnSpc>
@@ -3815,14 +3681,14 @@
             <a:buNone/>
           </a:pPr>
           <a:r>
-            <a:rPr lang="en-US" sz="1400" kern="1200" dirty="0"/>
+            <a:rPr lang="en-US" sz="1600" kern="1200" dirty="0"/>
             <a:t>Association</a:t>
           </a:r>
         </a:p>
       </dsp:txBody>
       <dsp:txXfrm>
-        <a:off x="5316307" y="3653209"/>
-        <a:ext cx="1347544" cy="836688"/>
+        <a:off x="5918945" y="3761142"/>
+        <a:ext cx="1500433" cy="931616"/>
       </dsp:txXfrm>
     </dsp:sp>
     <dsp:sp modelId="{0DED723F-F49C-4CB1-8CC9-FFD46C0C7496}">
@@ -3832,8 +3698,8 @@
       </dsp:nvSpPr>
       <dsp:spPr>
         <a:xfrm>
-          <a:off x="6848267" y="2183639"/>
-          <a:ext cx="1399606" cy="888750"/>
+          <a:off x="6671828" y="2124841"/>
+          <a:ext cx="1558401" cy="989584"/>
         </a:xfrm>
         <a:prstGeom prst="roundRect">
           <a:avLst>
@@ -3889,8 +3755,8 @@
       </dsp:nvSpPr>
       <dsp:spPr>
         <a:xfrm>
-          <a:off x="7003779" y="2331375"/>
-          <a:ext cx="1399606" cy="888750"/>
+          <a:off x="6844984" y="2289339"/>
+          <a:ext cx="1558401" cy="989584"/>
         </a:xfrm>
         <a:prstGeom prst="roundRect">
           <a:avLst>
@@ -3932,12 +3798,12 @@
         <a:fontRef idx="minor"/>
       </dsp:style>
       <dsp:txBody>
-        <a:bodyPr spcFirstLastPara="0" vert="horz" wrap="square" lIns="53340" tIns="53340" rIns="53340" bIns="53340" numCol="1" spcCol="1270" anchor="ctr" anchorCtr="0">
+        <a:bodyPr spcFirstLastPara="0" vert="horz" wrap="square" lIns="60960" tIns="60960" rIns="60960" bIns="60960" numCol="1" spcCol="1270" anchor="ctr" anchorCtr="0">
           <a:noAutofit/>
         </a:bodyPr>
         <a:lstStyle/>
         <a:p>
-          <a:pPr marL="0" lvl="0" indent="0" algn="ctr" defTabSz="622300">
+          <a:pPr marL="0" lvl="0" indent="0" algn="ctr" defTabSz="711200">
             <a:lnSpc>
               <a:spcPct val="90000"/>
             </a:lnSpc>
@@ -3950,149 +3816,14 @@
             <a:buNone/>
           </a:pPr>
           <a:r>
-            <a:rPr lang="en-US" sz="1400" kern="1200" dirty="0"/>
+            <a:rPr lang="en-US" sz="1600" kern="1200" dirty="0"/>
             <a:t>Reinforcement learning</a:t>
           </a:r>
         </a:p>
       </dsp:txBody>
       <dsp:txXfrm>
-        <a:off x="7029810" y="2357406"/>
-        <a:ext cx="1347544" cy="836688"/>
-      </dsp:txXfrm>
-    </dsp:sp>
-    <dsp:sp modelId="{8686607E-7FC0-44A2-85C3-F20088DD5A9F}">
-      <dsp:nvSpPr>
-        <dsp:cNvPr id="0" name=""/>
-        <dsp:cNvSpPr/>
-      </dsp:nvSpPr>
-      <dsp:spPr>
-        <a:xfrm>
-          <a:off x="6845394" y="3479441"/>
-          <a:ext cx="1399606" cy="888750"/>
-        </a:xfrm>
-        <a:prstGeom prst="roundRect">
-          <a:avLst>
-            <a:gd name="adj" fmla="val 10000"/>
-          </a:avLst>
-        </a:prstGeom>
-        <a:solidFill>
-          <a:schemeClr val="accent1">
-            <a:hueOff val="0"/>
-            <a:satOff val="0"/>
-            <a:lumOff val="0"/>
-            <a:alphaOff val="0"/>
-          </a:schemeClr>
-        </a:solidFill>
-        <a:ln w="47625" cap="flat" cmpd="dbl" algn="ctr">
-          <a:solidFill>
-            <a:schemeClr val="lt1">
-              <a:hueOff val="0"/>
-              <a:satOff val="0"/>
-              <a:lumOff val="0"/>
-              <a:alphaOff val="0"/>
-            </a:schemeClr>
-          </a:solidFill>
-          <a:prstDash val="solid"/>
-        </a:ln>
-        <a:effectLst>
-          <a:outerShdw blurRad="38100" dist="30000" dir="5400000" rotWithShape="0">
-            <a:srgbClr val="000000">
-              <a:alpha val="45000"/>
-            </a:srgbClr>
-          </a:outerShdw>
-        </a:effectLst>
-      </dsp:spPr>
-      <dsp:style>
-        <a:lnRef idx="3">
-          <a:scrgbClr r="0" g="0" b="0"/>
-        </a:lnRef>
-        <a:fillRef idx="1">
-          <a:scrgbClr r="0" g="0" b="0"/>
-        </a:fillRef>
-        <a:effectRef idx="1">
-          <a:scrgbClr r="0" g="0" b="0"/>
-        </a:effectRef>
-        <a:fontRef idx="minor">
-          <a:schemeClr val="lt1"/>
-        </a:fontRef>
-      </dsp:style>
-    </dsp:sp>
-    <dsp:sp modelId="{83801248-6BC8-4731-9B1E-5A67DD3064DB}">
-      <dsp:nvSpPr>
-        <dsp:cNvPr id="0" name=""/>
-        <dsp:cNvSpPr/>
-      </dsp:nvSpPr>
-      <dsp:spPr>
-        <a:xfrm>
-          <a:off x="7000906" y="3627178"/>
-          <a:ext cx="1399606" cy="888750"/>
-        </a:xfrm>
-        <a:prstGeom prst="roundRect">
-          <a:avLst>
-            <a:gd name="adj" fmla="val 10000"/>
-          </a:avLst>
-        </a:prstGeom>
-        <a:solidFill>
-          <a:schemeClr val="lt1">
-            <a:alpha val="90000"/>
-            <a:hueOff val="0"/>
-            <a:satOff val="0"/>
-            <a:lumOff val="0"/>
-            <a:alphaOff val="0"/>
-          </a:schemeClr>
-        </a:solidFill>
-        <a:ln w="19050" cap="flat" cmpd="sng" algn="ctr">
-          <a:solidFill>
-            <a:schemeClr val="accent1">
-              <a:hueOff val="0"/>
-              <a:satOff val="0"/>
-              <a:lumOff val="0"/>
-              <a:alphaOff val="0"/>
-            </a:schemeClr>
-          </a:solidFill>
-          <a:prstDash val="solid"/>
-        </a:ln>
-        <a:effectLst/>
-      </dsp:spPr>
-      <dsp:style>
-        <a:lnRef idx="2">
-          <a:scrgbClr r="0" g="0" b="0"/>
-        </a:lnRef>
-        <a:fillRef idx="1">
-          <a:scrgbClr r="0" g="0" b="0"/>
-        </a:fillRef>
-        <a:effectRef idx="0">
-          <a:scrgbClr r="0" g="0" b="0"/>
-        </a:effectRef>
-        <a:fontRef idx="minor"/>
-      </dsp:style>
-      <dsp:txBody>
-        <a:bodyPr spcFirstLastPara="0" vert="horz" wrap="square" lIns="53340" tIns="53340" rIns="53340" bIns="53340" numCol="1" spcCol="1270" anchor="ctr" anchorCtr="0">
-          <a:noAutofit/>
-        </a:bodyPr>
-        <a:lstStyle/>
-        <a:p>
-          <a:pPr marL="0" lvl="0" indent="0" algn="ctr" defTabSz="622300">
-            <a:lnSpc>
-              <a:spcPct val="90000"/>
-            </a:lnSpc>
-            <a:spcBef>
-              <a:spcPct val="0"/>
-            </a:spcBef>
-            <a:spcAft>
-              <a:spcPct val="35000"/>
-            </a:spcAft>
-            <a:buNone/>
-          </a:pPr>
-          <a:r>
-            <a:rPr lang="en-US" sz="1400" kern="1200" dirty="0"/>
-            <a:t>Deep Q Networks</a:t>
-          </a:r>
-        </a:p>
-      </dsp:txBody>
-      <dsp:txXfrm>
-        <a:off x="7026937" y="3653209"/>
-        <a:ext cx="1347544" cy="836688"/>
+        <a:off x="6873968" y="2318323"/>
+        <a:ext cx="1500433" cy="931616"/>
       </dsp:txXfrm>
     </dsp:sp>
   </dsp:spTree>
@@ -13906,8 +13637,8 @@
         </p:nvSpPr>
         <p:spPr bwMode="black">
           <a:xfrm>
-            <a:off x="756088" y="1759153"/>
-            <a:ext cx="2583150" cy="3312216"/>
+            <a:off x="2084677" y="1210054"/>
+            <a:ext cx="8025819" cy="1480803"/>
           </a:xfrm>
           <a:prstGeom prst="rect">
             <a:avLst/>
@@ -14164,7 +13895,7 @@
         </p:nvSpPr>
         <p:spPr bwMode="black">
           <a:xfrm>
-            <a:off x="3535797" y="1759153"/>
+            <a:off x="2084679" y="2839202"/>
             <a:ext cx="2583150" cy="3312216"/>
           </a:xfrm>
           <a:prstGeom prst="rect">
@@ -14394,7 +14125,7 @@
         </p:nvSpPr>
         <p:spPr bwMode="black">
           <a:xfrm>
-            <a:off x="8978464" y="1758900"/>
+            <a:off x="7527346" y="2838949"/>
             <a:ext cx="2583150" cy="3312469"/>
           </a:xfrm>
           <a:prstGeom prst="rect">
@@ -14622,8 +14353,8 @@
         </p:nvSpPr>
         <p:spPr>
           <a:xfrm>
-            <a:off x="875597" y="3165656"/>
-            <a:ext cx="2344131" cy="1107996"/>
+            <a:off x="2170811" y="1966260"/>
+            <a:ext cx="7862692" cy="553998"/>
           </a:xfrm>
           <a:prstGeom prst="rect">
             <a:avLst/>
@@ -14660,7 +14391,7 @@
         </p:nvSpPr>
         <p:spPr>
           <a:xfrm>
-            <a:off x="3613139" y="3165656"/>
+            <a:off x="2162021" y="4245705"/>
             <a:ext cx="2429164" cy="1384995"/>
           </a:xfrm>
           <a:prstGeom prst="rect">
@@ -14698,7 +14429,7 @@
         </p:nvSpPr>
         <p:spPr>
           <a:xfrm>
-            <a:off x="9055457" y="3165656"/>
+            <a:off x="7604339" y="4245705"/>
             <a:ext cx="2429164" cy="1661993"/>
           </a:xfrm>
           <a:prstGeom prst="rect">
@@ -14736,8 +14467,8 @@
         </p:nvSpPr>
         <p:spPr>
           <a:xfrm>
-            <a:off x="1526653" y="1842283"/>
-            <a:ext cx="1042017" cy="615553"/>
+            <a:off x="5325647" y="1394475"/>
+            <a:ext cx="1543184" cy="307777"/>
           </a:xfrm>
           <a:prstGeom prst="rect">
             <a:avLst/>
@@ -14774,7 +14505,7 @@
         </p:nvSpPr>
         <p:spPr>
           <a:xfrm>
-            <a:off x="4198169" y="1842285"/>
+            <a:off x="2747051" y="2922334"/>
             <a:ext cx="1258406" cy="615553"/>
           </a:xfrm>
           <a:prstGeom prst="rect">
@@ -14821,7 +14552,7 @@
         </p:nvSpPr>
         <p:spPr>
           <a:xfrm>
-            <a:off x="9371582" y="1842285"/>
+            <a:off x="7920464" y="2922334"/>
             <a:ext cx="1796913" cy="615553"/>
           </a:xfrm>
           <a:prstGeom prst="rect">
@@ -14870,7 +14601,7 @@
         </p:nvSpPr>
         <p:spPr bwMode="black">
           <a:xfrm>
-            <a:off x="6257130" y="1759153"/>
+            <a:off x="4806012" y="2839202"/>
             <a:ext cx="2583150" cy="3312216"/>
           </a:xfrm>
           <a:prstGeom prst="rect">
@@ -15098,7 +14829,7 @@
         </p:nvSpPr>
         <p:spPr>
           <a:xfrm>
-            <a:off x="6334310" y="3165656"/>
+            <a:off x="4883192" y="4245705"/>
             <a:ext cx="2429164" cy="1384995"/>
           </a:xfrm>
           <a:prstGeom prst="rect">
@@ -15139,7 +14870,7 @@
         </p:nvSpPr>
         <p:spPr>
           <a:xfrm>
-            <a:off x="6919502" y="1842284"/>
+            <a:off x="5468384" y="2922333"/>
             <a:ext cx="1258406" cy="615553"/>
           </a:xfrm>
           <a:prstGeom prst="rect">
@@ -15920,10 +15651,10 @@
           </p:sp>
           <p:sp>
             <p:nvSpPr>
-              <p:cNvPr id="10" name="Oval 9">
+              <p:cNvPr id="12" name="Oval 11">
                 <a:extLst>
                   <a:ext uri="{FF2B5EF4-FFF2-40B4-BE49-F238E27FC236}">
-                    <a16:creationId xmlns:a16="http://schemas.microsoft.com/office/drawing/2014/main" id="{23E41CA9-096B-411E-A7F7-1F7F41ED56CC}"/>
+                    <a16:creationId xmlns:a16="http://schemas.microsoft.com/office/drawing/2014/main" id="{5B73BBAA-5A5A-46AF-8EAE-CFBE386C649E}"/>
                   </a:ext>
                 </a:extLst>
               </p:cNvPr>
@@ -15932,14 +15663,14 @@
             </p:nvSpPr>
             <p:spPr bwMode="gray">
               <a:xfrm>
-                <a:off x="4794460" y="2973833"/>
-                <a:ext cx="2605557" cy="2605557"/>
+                <a:off x="6563063" y="2747314"/>
+                <a:ext cx="2832076" cy="2832076"/>
               </a:xfrm>
               <a:prstGeom prst="ellipse">
                 <a:avLst/>
               </a:prstGeom>
               <a:solidFill>
-                <a:schemeClr val="accent4">
+                <a:schemeClr val="accent5">
                   <a:lumMod val="75000"/>
                 </a:schemeClr>
               </a:solidFill>
@@ -15987,10 +15718,10 @@
           </p:sp>
           <p:sp>
             <p:nvSpPr>
-              <p:cNvPr id="12" name="Oval 11">
+              <p:cNvPr id="10" name="Oval 9">
                 <a:extLst>
                   <a:ext uri="{FF2B5EF4-FFF2-40B4-BE49-F238E27FC236}">
-                    <a16:creationId xmlns:a16="http://schemas.microsoft.com/office/drawing/2014/main" id="{5B73BBAA-5A5A-46AF-8EAE-CFBE386C649E}"/>
+                    <a16:creationId xmlns:a16="http://schemas.microsoft.com/office/drawing/2014/main" id="{23E41CA9-096B-411E-A7F7-1F7F41ED56CC}"/>
                   </a:ext>
                 </a:extLst>
               </p:cNvPr>
@@ -15999,14 +15730,14 @@
             </p:nvSpPr>
             <p:spPr bwMode="gray">
               <a:xfrm>
-                <a:off x="6563063" y="2747314"/>
-                <a:ext cx="2832076" cy="2832076"/>
+                <a:off x="4794460" y="2973833"/>
+                <a:ext cx="2605557" cy="2605557"/>
               </a:xfrm>
               <a:prstGeom prst="ellipse">
                 <a:avLst/>
               </a:prstGeom>
               <a:solidFill>
-                <a:schemeClr val="accent5">
+                <a:schemeClr val="accent4">
                   <a:lumMod val="75000"/>
                 </a:schemeClr>
               </a:solidFill>
@@ -16922,7 +16653,7 @@
           <p:nvPr>
             <p:extLst>
               <p:ext uri="{D42A27DB-BD31-4B8C-83A1-F6EECF244321}">
-                <p14:modId xmlns:p14="http://schemas.microsoft.com/office/powerpoint/2010/main" val="4122429231"/>
+                <p14:modId xmlns:p14="http://schemas.microsoft.com/office/powerpoint/2010/main" val="4225473494"/>
               </p:ext>
             </p:extLst>
           </p:nvPr>

</xml_diff>